<commit_message>
fixed the name of the team
</commit_message>
<xml_diff>
--- a/Presentation.pptx
+++ b/Presentation.pptx
@@ -3188,7 +3188,55 @@
                 </a:solidFill>
                 <a:latin typeface="Century Gothic" panose="020B0502020202020204" pitchFamily="34" charset="0"/>
               </a:rPr>
-              <a:t> AKARIA | Software </a:t>
+              <a:t> </a:t>
+            </a:r>
+            <a:r>
+              <a:rPr lang="bg-BG" sz="4300" dirty="0" smtClean="0">
+                <a:solidFill>
+                  <a:schemeClr val="tx2">
+                    <a:lumMod val="60000"/>
+                    <a:lumOff val="40000"/>
+                  </a:schemeClr>
+                </a:solidFill>
+                <a:latin typeface="Century Gothic" panose="020B0502020202020204" pitchFamily="34" charset="0"/>
+              </a:rPr>
+              <a:t>AK</a:t>
+            </a:r>
+            <a:r>
+              <a:rPr lang="en-US" sz="4300" dirty="0" smtClean="0">
+                <a:solidFill>
+                  <a:schemeClr val="tx2">
+                    <a:lumMod val="60000"/>
+                    <a:lumOff val="40000"/>
+                  </a:schemeClr>
+                </a:solidFill>
+                <a:latin typeface="Century Gothic" panose="020B0502020202020204" pitchFamily="34" charset="0"/>
+              </a:rPr>
+              <a:t>RA</a:t>
+            </a:r>
+            <a:r>
+              <a:rPr lang="bg-BG" sz="4300" dirty="0" smtClean="0">
+                <a:solidFill>
+                  <a:schemeClr val="tx2">
+                    <a:lumMod val="60000"/>
+                    <a:lumOff val="40000"/>
+                  </a:schemeClr>
+                </a:solidFill>
+                <a:latin typeface="Century Gothic" panose="020B0502020202020204" pitchFamily="34" charset="0"/>
+              </a:rPr>
+              <a:t>IA </a:t>
+            </a:r>
+            <a:r>
+              <a:rPr lang="bg-BG" sz="4300" dirty="0" smtClean="0">
+                <a:solidFill>
+                  <a:schemeClr val="tx2">
+                    <a:lumMod val="60000"/>
+                    <a:lumOff val="40000"/>
+                  </a:schemeClr>
+                </a:solidFill>
+                <a:latin typeface="Century Gothic" panose="020B0502020202020204" pitchFamily="34" charset="0"/>
+              </a:rPr>
+              <a:t>| Software </a:t>
             </a:r>
             <a:r>
               <a:rPr lang="bg-BG" sz="4300" dirty="0" err="1" smtClean="0">
@@ -3944,19 +3992,7 @@
                 </a:solidFill>
                 <a:latin typeface="Century Gothic" panose="020B0502020202020204" pitchFamily="34" charset="0"/>
               </a:rPr>
-              <a:t>M</a:t>
-            </a:r>
-            <a:r>
-              <a:rPr lang="en-US" sz="4000" dirty="0" err="1" smtClean="0">
-                <a:solidFill>
-                  <a:schemeClr val="tx2">
-                    <a:lumMod val="60000"/>
-                    <a:lumOff val="40000"/>
-                  </a:schemeClr>
-                </a:solidFill>
-                <a:latin typeface="Century Gothic" panose="020B0502020202020204" pitchFamily="34" charset="0"/>
-              </a:rPr>
-              <a:t>anchev</a:t>
+              <a:t>Manchev</a:t>
             </a:r>
             <a:r>
               <a:rPr lang="en-US" sz="4000" dirty="0" smtClean="0">
@@ -4043,7 +4079,7 @@
                 </a:solidFill>
                 <a:latin typeface="Century Gothic" panose="020B0502020202020204" pitchFamily="34" charset="0"/>
               </a:rPr>
-              <a:t>TeamAkaria</a:t>
+              <a:t>TeamAkraia</a:t>
             </a:r>
             <a:endParaRPr lang="bg-BG" sz="9100" b="1" dirty="0">
               <a:solidFill>

</xml_diff>